<commit_message>
Added sample for Multinomial Naive Bayes, Renamed files
</commit_message>
<xml_diff>
--- a/6 - Naive Bayes/Conditional Probability.pptx
+++ b/6 - Naive Bayes/Conditional Probability.pptx
@@ -7634,8 +7634,8 @@
           </p:spPr>
         </p:pic>
       </p:grpSp>
-      <mc:AlternateContent xmlns:mc="http://schemas.openxmlformats.org/markup-compatibility/2006">
-        <mc:Choice xmlns:a14="http://schemas.microsoft.com/office/drawing/2010/main" Requires="a14">
+      <mc:AlternateContent xmlns:mc="http://schemas.openxmlformats.org/markup-compatibility/2006" xmlns:a14="http://schemas.microsoft.com/office/drawing/2010/main">
+        <mc:Choice Requires="a14">
           <p:sp>
             <p:nvSpPr>
               <p:cNvPr id="26" name="TextBox 25">
@@ -7715,7 +7715,7 @@
             </p:txBody>
           </p:sp>
         </mc:Choice>
-        <mc:Fallback>
+        <mc:Fallback xmlns="">
           <p:sp>
             <p:nvSpPr>
               <p:cNvPr id="26" name="TextBox 25">
@@ -7760,8 +7760,8 @@
           </p:sp>
         </mc:Fallback>
       </mc:AlternateContent>
-      <mc:AlternateContent xmlns:mc="http://schemas.openxmlformats.org/markup-compatibility/2006">
-        <mc:Choice xmlns:a14="http://schemas.microsoft.com/office/drawing/2010/main" Requires="a14">
+      <mc:AlternateContent xmlns:mc="http://schemas.openxmlformats.org/markup-compatibility/2006" xmlns:a14="http://schemas.microsoft.com/office/drawing/2010/main">
+        <mc:Choice Requires="a14">
           <p:sp>
             <p:nvSpPr>
               <p:cNvPr id="28" name="TextBox 27">
@@ -7845,7 +7845,7 @@
             </p:txBody>
           </p:sp>
         </mc:Choice>
-        <mc:Fallback>
+        <mc:Fallback xmlns="">
           <p:sp>
             <p:nvSpPr>
               <p:cNvPr id="28" name="TextBox 27">
@@ -7890,8 +7890,8 @@
           </p:sp>
         </mc:Fallback>
       </mc:AlternateContent>
-      <mc:AlternateContent xmlns:mc="http://schemas.openxmlformats.org/markup-compatibility/2006">
-        <mc:Choice xmlns:a14="http://schemas.microsoft.com/office/drawing/2010/main" Requires="a14">
+      <mc:AlternateContent xmlns:mc="http://schemas.openxmlformats.org/markup-compatibility/2006" xmlns:a14="http://schemas.microsoft.com/office/drawing/2010/main">
+        <mc:Choice Requires="a14">
           <p:sp>
             <p:nvSpPr>
               <p:cNvPr id="37" name="TextBox 36">
@@ -7991,7 +7991,7 @@
             </p:txBody>
           </p:sp>
         </mc:Choice>
-        <mc:Fallback>
+        <mc:Fallback xmlns="">
           <p:sp>
             <p:nvSpPr>
               <p:cNvPr id="37" name="TextBox 36">
@@ -8036,8 +8036,8 @@
           </p:sp>
         </mc:Fallback>
       </mc:AlternateContent>
-      <mc:AlternateContent xmlns:mc="http://schemas.openxmlformats.org/markup-compatibility/2006">
-        <mc:Choice xmlns:a14="http://schemas.microsoft.com/office/drawing/2010/main" Requires="a14">
+      <mc:AlternateContent xmlns:mc="http://schemas.openxmlformats.org/markup-compatibility/2006" xmlns:a14="http://schemas.microsoft.com/office/drawing/2010/main">
+        <mc:Choice Requires="a14">
           <p:sp>
             <p:nvSpPr>
               <p:cNvPr id="38" name="TextBox 37">
@@ -8158,7 +8158,7 @@
             </p:txBody>
           </p:sp>
         </mc:Choice>
-        <mc:Fallback>
+        <mc:Fallback xmlns="">
           <p:sp>
             <p:nvSpPr>
               <p:cNvPr id="38" name="TextBox 37">
@@ -9109,8 +9109,8 @@
           </a:p>
         </p:txBody>
       </p:sp>
-      <mc:AlternateContent xmlns:mc="http://schemas.openxmlformats.org/markup-compatibility/2006">
-        <mc:Choice xmlns:a14="http://schemas.microsoft.com/office/drawing/2010/main" Requires="a14">
+      <mc:AlternateContent xmlns:mc="http://schemas.openxmlformats.org/markup-compatibility/2006" xmlns:a14="http://schemas.microsoft.com/office/drawing/2010/main">
+        <mc:Choice Requires="a14">
           <p:sp>
             <p:nvSpPr>
               <p:cNvPr id="39" name="TextBox 38">
@@ -9199,7 +9199,7 @@
             </p:txBody>
           </p:sp>
         </mc:Choice>
-        <mc:Fallback>
+        <mc:Fallback xmlns="">
           <p:sp>
             <p:nvSpPr>
               <p:cNvPr id="39" name="TextBox 38">
@@ -10112,42 +10112,6 @@
             </a:solidFill>
           </p:spPr>
         </p:pic>
-        <p:pic>
-          <p:nvPicPr>
-            <p:cNvPr id="12" name="Picture 11" descr="A black and white dice&#10;&#10;Description automatically generated">
-              <a:extLst>
-                <a:ext uri="{FF2B5EF4-FFF2-40B4-BE49-F238E27FC236}">
-                  <a16:creationId xmlns:a16="http://schemas.microsoft.com/office/drawing/2014/main" id="{8F9D63E7-2E79-5DD3-8C51-F1993396E9A5}"/>
-                </a:ext>
-              </a:extLst>
-            </p:cNvPr>
-            <p:cNvPicPr>
-              <a:picLocks noChangeAspect="1"/>
-            </p:cNvPicPr>
-            <p:nvPr/>
-          </p:nvPicPr>
-          <p:blipFill>
-            <a:blip r:embed="rId8">
-              <a:extLst>
-                <a:ext uri="{28A0092B-C50C-407E-A947-70E740481C1C}">
-                  <a14:useLocalDpi xmlns:a14="http://schemas.microsoft.com/office/drawing/2010/main" val="0"/>
-                </a:ext>
-              </a:extLst>
-            </a:blip>
-            <a:stretch>
-              <a:fillRect/>
-            </a:stretch>
-          </p:blipFill>
-          <p:spPr>
-            <a:xfrm>
-              <a:off x="7075494" y="3766936"/>
-              <a:ext cx="720000" cy="720000"/>
-            </a:xfrm>
-            <a:prstGeom prst="rect">
-              <a:avLst/>
-            </a:prstGeom>
-          </p:spPr>
-        </p:pic>
         <p:sp>
           <p:nvSpPr>
             <p:cNvPr id="13" name="Oval 12">
@@ -10200,8 +10164,8 @@
             </a:p>
           </p:txBody>
         </p:sp>
-        <mc:AlternateContent xmlns:mc="http://schemas.openxmlformats.org/markup-compatibility/2006">
-          <mc:Choice xmlns:a14="http://schemas.microsoft.com/office/drawing/2010/main" Requires="a14">
+        <mc:AlternateContent xmlns:mc="http://schemas.openxmlformats.org/markup-compatibility/2006" xmlns:a14="http://schemas.microsoft.com/office/drawing/2010/main">
+          <mc:Choice Requires="a14">
             <p:sp>
               <p:nvSpPr>
                 <p:cNvPr id="16" name="TextBox 15">
@@ -10281,7 +10245,7 @@
               </p:txBody>
             </p:sp>
           </mc:Choice>
-          <mc:Fallback>
+          <mc:Fallback xmlns="">
             <p:sp>
               <p:nvSpPr>
                 <p:cNvPr id="16" name="TextBox 15">
@@ -10326,8 +10290,8 @@
             </p:sp>
           </mc:Fallback>
         </mc:AlternateContent>
-        <mc:AlternateContent xmlns:mc="http://schemas.openxmlformats.org/markup-compatibility/2006">
-          <mc:Choice xmlns:a14="http://schemas.microsoft.com/office/drawing/2010/main" Requires="a14">
+        <mc:AlternateContent xmlns:mc="http://schemas.openxmlformats.org/markup-compatibility/2006" xmlns:a14="http://schemas.microsoft.com/office/drawing/2010/main">
+          <mc:Choice Requires="a14">
             <p:sp>
               <p:nvSpPr>
                 <p:cNvPr id="17" name="TextBox 16">
@@ -10411,7 +10375,7 @@
               </p:txBody>
             </p:sp>
           </mc:Choice>
-          <mc:Fallback>
+          <mc:Fallback xmlns="">
             <p:sp>
               <p:nvSpPr>
                 <p:cNvPr id="17" name="TextBox 16">
@@ -10457,8 +10421,8 @@
           </mc:Fallback>
         </mc:AlternateContent>
       </p:grpSp>
-      <mc:AlternateContent xmlns:mc="http://schemas.openxmlformats.org/markup-compatibility/2006">
-        <mc:Choice xmlns:a14="http://schemas.microsoft.com/office/drawing/2010/main" Requires="a14">
+      <mc:AlternateContent xmlns:mc="http://schemas.openxmlformats.org/markup-compatibility/2006" xmlns:a14="http://schemas.microsoft.com/office/drawing/2010/main">
+        <mc:Choice Requires="a14">
           <p:sp>
             <p:nvSpPr>
               <p:cNvPr id="19" name="TextBox 18">
@@ -10613,7 +10577,7 @@
             </p:txBody>
           </p:sp>
         </mc:Choice>
-        <mc:Fallback>
+        <mc:Fallback xmlns="">
           <p:sp>
             <p:nvSpPr>
               <p:cNvPr id="19" name="TextBox 18">
@@ -10658,8 +10622,8 @@
           </p:sp>
         </mc:Fallback>
       </mc:AlternateContent>
-      <mc:AlternateContent xmlns:mc="http://schemas.openxmlformats.org/markup-compatibility/2006">
-        <mc:Choice xmlns:a14="http://schemas.microsoft.com/office/drawing/2010/main" Requires="a14">
+      <mc:AlternateContent xmlns:mc="http://schemas.openxmlformats.org/markup-compatibility/2006" xmlns:a14="http://schemas.microsoft.com/office/drawing/2010/main">
+        <mc:Choice Requires="a14">
           <p:sp>
             <p:nvSpPr>
               <p:cNvPr id="3" name="TextBox 2">
@@ -10793,7 +10757,7 @@
             </p:txBody>
           </p:sp>
         </mc:Choice>
-        <mc:Fallback>
+        <mc:Fallback xmlns="">
           <p:sp>
             <p:nvSpPr>
               <p:cNvPr id="3" name="TextBox 2">
@@ -11049,8 +11013,8 @@
           </a:p>
         </p:txBody>
       </p:sp>
-      <mc:AlternateContent xmlns:mc="http://schemas.openxmlformats.org/markup-compatibility/2006">
-        <mc:Choice xmlns:a14="http://schemas.microsoft.com/office/drawing/2010/main" Requires="a14">
+      <mc:AlternateContent xmlns:mc="http://schemas.openxmlformats.org/markup-compatibility/2006" xmlns:a14="http://schemas.microsoft.com/office/drawing/2010/main">
+        <mc:Choice Requires="a14">
           <p:sp>
             <p:nvSpPr>
               <p:cNvPr id="11" name="TextBox 10">
@@ -11171,7 +11135,7 @@
             </p:txBody>
           </p:sp>
         </mc:Choice>
-        <mc:Fallback>
+        <mc:Fallback xmlns="">
           <p:sp>
             <p:nvSpPr>
               <p:cNvPr id="11" name="TextBox 10">
@@ -11216,6 +11180,42 @@
           </p:sp>
         </mc:Fallback>
       </mc:AlternateContent>
+      <p:pic>
+        <p:nvPicPr>
+          <p:cNvPr id="9" name="Picture 8" descr="A black and white dice with black dots&#10;&#10;Description automatically generated">
+            <a:extLst>
+              <a:ext uri="{FF2B5EF4-FFF2-40B4-BE49-F238E27FC236}">
+                <a16:creationId xmlns:a16="http://schemas.microsoft.com/office/drawing/2014/main" id="{202A7CE3-A21A-A2B7-77D4-D1A4A208F28F}"/>
+              </a:ext>
+            </a:extLst>
+          </p:cNvPr>
+          <p:cNvPicPr>
+            <a:picLocks noChangeAspect="1"/>
+          </p:cNvPicPr>
+          <p:nvPr/>
+        </p:nvPicPr>
+        <p:blipFill>
+          <a:blip r:embed="rId14">
+            <a:extLst>
+              <a:ext uri="{28A0092B-C50C-407E-A947-70E740481C1C}">
+                <a14:useLocalDpi xmlns:a14="http://schemas.microsoft.com/office/drawing/2010/main" val="0"/>
+              </a:ext>
+            </a:extLst>
+          </a:blip>
+          <a:stretch>
+            <a:fillRect/>
+          </a:stretch>
+        </p:blipFill>
+        <p:spPr>
+          <a:xfrm>
+            <a:off x="6937782" y="3469663"/>
+            <a:ext cx="723600" cy="723600"/>
+          </a:xfrm>
+          <a:prstGeom prst="rect">
+            <a:avLst/>
+          </a:prstGeom>
+        </p:spPr>
+      </p:pic>
     </p:spTree>
     <p:extLst>
       <p:ext uri="{BB962C8B-B14F-4D97-AF65-F5344CB8AC3E}">
@@ -11711,6 +11711,59 @@
                       </p:childTnLst>
                     </p:cTn>
                   </p:par>
+                  <p:par>
+                    <p:cTn id="48" fill="hold">
+                      <p:stCondLst>
+                        <p:cond delay="indefinite"/>
+                      </p:stCondLst>
+                      <p:childTnLst>
+                        <p:par>
+                          <p:cTn id="49" fill="hold">
+                            <p:stCondLst>
+                              <p:cond delay="0"/>
+                            </p:stCondLst>
+                            <p:childTnLst>
+                              <p:par>
+                                <p:cTn id="50" presetID="9" presetClass="entr" presetSubtype="0" fill="hold" nodeType="clickEffect">
+                                  <p:stCondLst>
+                                    <p:cond delay="0"/>
+                                  </p:stCondLst>
+                                  <p:childTnLst>
+                                    <p:set>
+                                      <p:cBhvr>
+                                        <p:cTn id="51" dur="1" fill="hold">
+                                          <p:stCondLst>
+                                            <p:cond delay="0"/>
+                                          </p:stCondLst>
+                                        </p:cTn>
+                                        <p:tgtEl>
+                                          <p:spTgt spid="9"/>
+                                        </p:tgtEl>
+                                        <p:attrNameLst>
+                                          <p:attrName>style.visibility</p:attrName>
+                                        </p:attrNameLst>
+                                      </p:cBhvr>
+                                      <p:to>
+                                        <p:strVal val="visible"/>
+                                      </p:to>
+                                    </p:set>
+                                    <p:animEffect transition="in" filter="dissolve">
+                                      <p:cBhvr>
+                                        <p:cTn id="52" dur="500"/>
+                                        <p:tgtEl>
+                                          <p:spTgt spid="9"/>
+                                        </p:tgtEl>
+                                      </p:cBhvr>
+                                    </p:animEffect>
+                                  </p:childTnLst>
+                                </p:cTn>
+                              </p:par>
+                            </p:childTnLst>
+                          </p:cTn>
+                        </p:par>
+                      </p:childTnLst>
+                    </p:cTn>
+                  </p:par>
                 </p:childTnLst>
               </p:cTn>
               <p:prevCondLst>
@@ -11860,8 +11913,8 @@
           </a:p>
         </p:txBody>
       </p:sp>
-      <mc:AlternateContent xmlns:mc="http://schemas.openxmlformats.org/markup-compatibility/2006">
-        <mc:Choice xmlns:a14="http://schemas.microsoft.com/office/drawing/2010/main" Requires="a14">
+      <mc:AlternateContent xmlns:mc="http://schemas.openxmlformats.org/markup-compatibility/2006" xmlns:a14="http://schemas.microsoft.com/office/drawing/2010/main">
+        <mc:Choice Requires="a14">
           <p:sp>
             <p:nvSpPr>
               <p:cNvPr id="39" name="TextBox 38">
@@ -11950,7 +12003,7 @@
             </p:txBody>
           </p:sp>
         </mc:Choice>
-        <mc:Fallback>
+        <mc:Fallback xmlns="">
           <p:sp>
             <p:nvSpPr>
               <p:cNvPr id="39" name="TextBox 38">
@@ -12807,44 +12860,8 @@
           </a:solidFill>
         </p:spPr>
       </p:pic>
-      <p:pic>
-        <p:nvPicPr>
-          <p:cNvPr id="12" name="Picture 11" descr="A black and white dice&#10;&#10;Description automatically generated">
-            <a:extLst>
-              <a:ext uri="{FF2B5EF4-FFF2-40B4-BE49-F238E27FC236}">
-                <a16:creationId xmlns:a16="http://schemas.microsoft.com/office/drawing/2014/main" id="{8F9D63E7-2E79-5DD3-8C51-F1993396E9A5}"/>
-              </a:ext>
-            </a:extLst>
-          </p:cNvPr>
-          <p:cNvPicPr>
-            <a:picLocks noChangeAspect="1"/>
-          </p:cNvPicPr>
-          <p:nvPr/>
-        </p:nvPicPr>
-        <p:blipFill>
-          <a:blip r:embed="rId7">
-            <a:extLst>
-              <a:ext uri="{28A0092B-C50C-407E-A947-70E740481C1C}">
-                <a14:useLocalDpi xmlns:a14="http://schemas.microsoft.com/office/drawing/2010/main" val="0"/>
-              </a:ext>
-            </a:extLst>
-          </a:blip>
-          <a:stretch>
-            <a:fillRect/>
-          </a:stretch>
-        </p:blipFill>
-        <p:spPr>
-          <a:xfrm>
-            <a:off x="7075494" y="3766936"/>
-            <a:ext cx="720000" cy="720000"/>
-          </a:xfrm>
-          <a:prstGeom prst="rect">
-            <a:avLst/>
-          </a:prstGeom>
-        </p:spPr>
-      </p:pic>
-      <mc:AlternateContent xmlns:mc="http://schemas.openxmlformats.org/markup-compatibility/2006">
-        <mc:Choice xmlns:a14="http://schemas.microsoft.com/office/drawing/2010/main" Requires="a14">
+      <mc:AlternateContent xmlns:mc="http://schemas.openxmlformats.org/markup-compatibility/2006" xmlns:a14="http://schemas.microsoft.com/office/drawing/2010/main">
+        <mc:Choice Requires="a14">
           <p:sp>
             <p:nvSpPr>
               <p:cNvPr id="16" name="TextBox 15">
@@ -12924,7 +12941,7 @@
             </p:txBody>
           </p:sp>
         </mc:Choice>
-        <mc:Fallback>
+        <mc:Fallback xmlns="">
           <p:sp>
             <p:nvSpPr>
               <p:cNvPr id="16" name="TextBox 15">
@@ -12969,8 +12986,8 @@
           </p:sp>
         </mc:Fallback>
       </mc:AlternateContent>
-      <mc:AlternateContent xmlns:mc="http://schemas.openxmlformats.org/markup-compatibility/2006">
-        <mc:Choice xmlns:a14="http://schemas.microsoft.com/office/drawing/2010/main" Requires="a14">
+      <mc:AlternateContent xmlns:mc="http://schemas.openxmlformats.org/markup-compatibility/2006" xmlns:a14="http://schemas.microsoft.com/office/drawing/2010/main">
+        <mc:Choice Requires="a14">
           <p:sp>
             <p:nvSpPr>
               <p:cNvPr id="19" name="TextBox 18">
@@ -13125,7 +13142,7 @@
             </p:txBody>
           </p:sp>
         </mc:Choice>
-        <mc:Fallback>
+        <mc:Fallback xmlns="">
           <p:sp>
             <p:nvSpPr>
               <p:cNvPr id="19" name="TextBox 18">
@@ -13170,8 +13187,8 @@
           </p:sp>
         </mc:Fallback>
       </mc:AlternateContent>
-      <mc:AlternateContent xmlns:mc="http://schemas.openxmlformats.org/markup-compatibility/2006">
-        <mc:Choice xmlns:a14="http://schemas.microsoft.com/office/drawing/2010/main" Requires="a14">
+      <mc:AlternateContent xmlns:mc="http://schemas.openxmlformats.org/markup-compatibility/2006" xmlns:a14="http://schemas.microsoft.com/office/drawing/2010/main">
+        <mc:Choice Requires="a14">
           <p:sp>
             <p:nvSpPr>
               <p:cNvPr id="3" name="TextBox 2">
@@ -13304,7 +13321,7 @@
             </p:txBody>
           </p:sp>
         </mc:Choice>
-        <mc:Fallback>
+        <mc:Fallback xmlns="">
           <p:sp>
             <p:nvSpPr>
               <p:cNvPr id="3" name="TextBox 2">
@@ -13349,8 +13366,8 @@
           </p:sp>
         </mc:Fallback>
       </mc:AlternateContent>
-      <mc:AlternateContent xmlns:mc="http://schemas.openxmlformats.org/markup-compatibility/2006">
-        <mc:Choice xmlns:a14="http://schemas.microsoft.com/office/drawing/2010/main" Requires="a14">
+      <mc:AlternateContent xmlns:mc="http://schemas.openxmlformats.org/markup-compatibility/2006" xmlns:a14="http://schemas.microsoft.com/office/drawing/2010/main">
+        <mc:Choice Requires="a14">
           <p:sp>
             <p:nvSpPr>
               <p:cNvPr id="7" name="TextBox 6">
@@ -13475,7 +13492,7 @@
             </p:txBody>
           </p:sp>
         </mc:Choice>
-        <mc:Fallback>
+        <mc:Fallback xmlns="">
           <p:sp>
             <p:nvSpPr>
               <p:cNvPr id="7" name="TextBox 6">
@@ -13520,6 +13537,42 @@
           </p:sp>
         </mc:Fallback>
       </mc:AlternateContent>
+      <p:pic>
+        <p:nvPicPr>
+          <p:cNvPr id="5" name="Picture 4" descr="A black and white dice with black dots&#10;&#10;Description automatically generated">
+            <a:extLst>
+              <a:ext uri="{FF2B5EF4-FFF2-40B4-BE49-F238E27FC236}">
+                <a16:creationId xmlns:a16="http://schemas.microsoft.com/office/drawing/2014/main" id="{0AD34DC7-1F96-E5EE-AAC7-1975051E72D3}"/>
+              </a:ext>
+            </a:extLst>
+          </p:cNvPr>
+          <p:cNvPicPr>
+            <a:picLocks noChangeAspect="1"/>
+          </p:cNvPicPr>
+          <p:nvPr/>
+        </p:nvPicPr>
+        <p:blipFill>
+          <a:blip r:embed="rId12">
+            <a:extLst>
+              <a:ext uri="{28A0092B-C50C-407E-A947-70E740481C1C}">
+                <a14:useLocalDpi xmlns:a14="http://schemas.microsoft.com/office/drawing/2010/main" val="0"/>
+              </a:ext>
+            </a:extLst>
+          </a:blip>
+          <a:stretch>
+            <a:fillRect/>
+          </a:stretch>
+        </p:blipFill>
+        <p:spPr>
+          <a:xfrm>
+            <a:off x="7010596" y="3704533"/>
+            <a:ext cx="723600" cy="723600"/>
+          </a:xfrm>
+          <a:prstGeom prst="rect">
+            <a:avLst/>
+          </a:prstGeom>
+        </p:spPr>
+      </p:pic>
     </p:spTree>
     <p:extLst>
       <p:ext uri="{BB962C8B-B14F-4D97-AF65-F5344CB8AC3E}">
@@ -13656,7 +13709,7 @@
                                 </p:cTn>
                               </p:par>
                               <p:par>
-                                <p:cTn id="14" presetID="9" presetClass="entr" presetSubtype="0" fill="hold" nodeType="withEffect">
+                                <p:cTn id="14" presetID="9" presetClass="entr" presetSubtype="0" fill="hold" grpId="0" nodeType="withEffect">
                                   <p:stCondLst>
                                     <p:cond delay="0"/>
                                   </p:stCondLst>
@@ -13664,41 +13717,6 @@
                                     <p:set>
                                       <p:cBhvr>
                                         <p:cTn id="15" dur="1" fill="hold">
-                                          <p:stCondLst>
-                                            <p:cond delay="0"/>
-                                          </p:stCondLst>
-                                        </p:cTn>
-                                        <p:tgtEl>
-                                          <p:spTgt spid="12"/>
-                                        </p:tgtEl>
-                                        <p:attrNameLst>
-                                          <p:attrName>style.visibility</p:attrName>
-                                        </p:attrNameLst>
-                                      </p:cBhvr>
-                                      <p:to>
-                                        <p:strVal val="visible"/>
-                                      </p:to>
-                                    </p:set>
-                                    <p:animEffect transition="in" filter="dissolve">
-                                      <p:cBhvr>
-                                        <p:cTn id="16" dur="500"/>
-                                        <p:tgtEl>
-                                          <p:spTgt spid="12"/>
-                                        </p:tgtEl>
-                                      </p:cBhvr>
-                                    </p:animEffect>
-                                  </p:childTnLst>
-                                </p:cTn>
-                              </p:par>
-                              <p:par>
-                                <p:cTn id="17" presetID="9" presetClass="entr" presetSubtype="0" fill="hold" grpId="0" nodeType="withEffect">
-                                  <p:stCondLst>
-                                    <p:cond delay="0"/>
-                                  </p:stCondLst>
-                                  <p:childTnLst>
-                                    <p:set>
-                                      <p:cBhvr>
-                                        <p:cTn id="18" dur="1" fill="hold">
                                           <p:stCondLst>
                                             <p:cond delay="0"/>
                                           </p:stCondLst>
@@ -13716,7 +13734,7 @@
                                     </p:set>
                                     <p:animEffect transition="in" filter="dissolve">
                                       <p:cBhvr>
-                                        <p:cTn id="19" dur="500"/>
+                                        <p:cTn id="16" dur="500"/>
                                         <p:tgtEl>
                                           <p:spTgt spid="16"/>
                                         </p:tgtEl>
@@ -13732,26 +13750,26 @@
                     </p:cTn>
                   </p:par>
                   <p:par>
-                    <p:cTn id="20" fill="hold">
+                    <p:cTn id="17" fill="hold">
                       <p:stCondLst>
                         <p:cond delay="indefinite"/>
                       </p:stCondLst>
                       <p:childTnLst>
                         <p:par>
-                          <p:cTn id="21" fill="hold">
+                          <p:cTn id="18" fill="hold">
                             <p:stCondLst>
                               <p:cond delay="0"/>
                             </p:stCondLst>
                             <p:childTnLst>
                               <p:par>
-                                <p:cTn id="22" presetID="9" presetClass="entr" presetSubtype="0" fill="hold" grpId="0" nodeType="clickEffect">
+                                <p:cTn id="19" presetID="9" presetClass="entr" presetSubtype="0" fill="hold" grpId="0" nodeType="clickEffect">
                                   <p:stCondLst>
                                     <p:cond delay="0"/>
                                   </p:stCondLst>
                                   <p:childTnLst>
                                     <p:set>
                                       <p:cBhvr>
-                                        <p:cTn id="23" dur="1" fill="hold">
+                                        <p:cTn id="20" dur="1" fill="hold">
                                           <p:stCondLst>
                                             <p:cond delay="0"/>
                                           </p:stCondLst>
@@ -13769,7 +13787,7 @@
                                     </p:set>
                                     <p:animEffect transition="in" filter="dissolve">
                                       <p:cBhvr>
-                                        <p:cTn id="24" dur="500"/>
+                                        <p:cTn id="21" dur="500"/>
                                         <p:tgtEl>
                                           <p:spTgt spid="7"/>
                                         </p:tgtEl>
@@ -13785,26 +13803,26 @@
                     </p:cTn>
                   </p:par>
                   <p:par>
-                    <p:cTn id="25" fill="hold">
+                    <p:cTn id="22" fill="hold">
                       <p:stCondLst>
                         <p:cond delay="indefinite"/>
                       </p:stCondLst>
                       <p:childTnLst>
                         <p:par>
-                          <p:cTn id="26" fill="hold">
+                          <p:cTn id="23" fill="hold">
                             <p:stCondLst>
                               <p:cond delay="0"/>
                             </p:stCondLst>
                             <p:childTnLst>
                               <p:par>
-                                <p:cTn id="27" presetID="9" presetClass="entr" presetSubtype="0" fill="hold" grpId="0" nodeType="clickEffect">
+                                <p:cTn id="24" presetID="9" presetClass="entr" presetSubtype="0" fill="hold" grpId="0" nodeType="clickEffect">
                                   <p:stCondLst>
                                     <p:cond delay="0"/>
                                   </p:stCondLst>
                                   <p:childTnLst>
                                     <p:set>
                                       <p:cBhvr>
-                                        <p:cTn id="28" dur="1" fill="hold">
+                                        <p:cTn id="25" dur="1" fill="hold">
                                           <p:stCondLst>
                                             <p:cond delay="0"/>
                                           </p:stCondLst>
@@ -13822,9 +13840,62 @@
                                     </p:set>
                                     <p:animEffect transition="in" filter="dissolve">
                                       <p:cBhvr>
-                                        <p:cTn id="29" dur="500"/>
+                                        <p:cTn id="26" dur="500"/>
                                         <p:tgtEl>
                                           <p:spTgt spid="3"/>
+                                        </p:tgtEl>
+                                      </p:cBhvr>
+                                    </p:animEffect>
+                                  </p:childTnLst>
+                                </p:cTn>
+                              </p:par>
+                            </p:childTnLst>
+                          </p:cTn>
+                        </p:par>
+                      </p:childTnLst>
+                    </p:cTn>
+                  </p:par>
+                  <p:par>
+                    <p:cTn id="27" fill="hold">
+                      <p:stCondLst>
+                        <p:cond delay="indefinite"/>
+                      </p:stCondLst>
+                      <p:childTnLst>
+                        <p:par>
+                          <p:cTn id="28" fill="hold">
+                            <p:stCondLst>
+                              <p:cond delay="0"/>
+                            </p:stCondLst>
+                            <p:childTnLst>
+                              <p:par>
+                                <p:cTn id="29" presetID="9" presetClass="entr" presetSubtype="0" fill="hold" nodeType="clickEffect">
+                                  <p:stCondLst>
+                                    <p:cond delay="0"/>
+                                  </p:stCondLst>
+                                  <p:childTnLst>
+                                    <p:set>
+                                      <p:cBhvr>
+                                        <p:cTn id="30" dur="1" fill="hold">
+                                          <p:stCondLst>
+                                            <p:cond delay="0"/>
+                                          </p:stCondLst>
+                                        </p:cTn>
+                                        <p:tgtEl>
+                                          <p:spTgt spid="5"/>
+                                        </p:tgtEl>
+                                        <p:attrNameLst>
+                                          <p:attrName>style.visibility</p:attrName>
+                                        </p:attrNameLst>
+                                      </p:cBhvr>
+                                      <p:to>
+                                        <p:strVal val="visible"/>
+                                      </p:to>
+                                    </p:set>
+                                    <p:animEffect transition="in" filter="dissolve">
+                                      <p:cBhvr>
+                                        <p:cTn id="31" dur="500"/>
+                                        <p:tgtEl>
+                                          <p:spTgt spid="5"/>
                                         </p:tgtEl>
                                       </p:cBhvr>
                                     </p:animEffect>
@@ -13982,8 +14053,8 @@
           </a:p>
         </p:txBody>
       </p:sp>
-      <mc:AlternateContent xmlns:mc="http://schemas.openxmlformats.org/markup-compatibility/2006">
-        <mc:Choice xmlns:a14="http://schemas.microsoft.com/office/drawing/2010/main" Requires="a14">
+      <mc:AlternateContent xmlns:mc="http://schemas.openxmlformats.org/markup-compatibility/2006" xmlns:a14="http://schemas.microsoft.com/office/drawing/2010/main">
+        <mc:Choice Requires="a14">
           <p:sp>
             <p:nvSpPr>
               <p:cNvPr id="39" name="TextBox 38">
@@ -14072,7 +14143,7 @@
             </p:txBody>
           </p:sp>
         </mc:Choice>
-        <mc:Fallback>
+        <mc:Fallback xmlns="">
           <p:sp>
             <p:nvSpPr>
               <p:cNvPr id="39" name="TextBox 38">
@@ -14793,8 +14864,8 @@
           </a:p>
         </p:txBody>
       </p:sp>
-      <mc:AlternateContent xmlns:mc="http://schemas.openxmlformats.org/markup-compatibility/2006">
-        <mc:Choice xmlns:a14="http://schemas.microsoft.com/office/drawing/2010/main" Requires="a14">
+      <mc:AlternateContent xmlns:mc="http://schemas.openxmlformats.org/markup-compatibility/2006" xmlns:a14="http://schemas.microsoft.com/office/drawing/2010/main">
+        <mc:Choice Requires="a14">
           <p:sp>
             <p:nvSpPr>
               <p:cNvPr id="19" name="TextBox 18">
@@ -14949,7 +15020,7 @@
             </p:txBody>
           </p:sp>
         </mc:Choice>
-        <mc:Fallback>
+        <mc:Fallback xmlns="">
           <p:sp>
             <p:nvSpPr>
               <p:cNvPr id="19" name="TextBox 18">
@@ -14994,8 +15065,8 @@
           </p:sp>
         </mc:Fallback>
       </mc:AlternateContent>
-      <mc:AlternateContent xmlns:mc="http://schemas.openxmlformats.org/markup-compatibility/2006">
-        <mc:Choice xmlns:a14="http://schemas.microsoft.com/office/drawing/2010/main" Requires="a14">
+      <mc:AlternateContent xmlns:mc="http://schemas.openxmlformats.org/markup-compatibility/2006" xmlns:a14="http://schemas.microsoft.com/office/drawing/2010/main">
+        <mc:Choice Requires="a14">
           <p:sp>
             <p:nvSpPr>
               <p:cNvPr id="3" name="TextBox 2">
@@ -15177,7 +15248,7 @@
             </p:txBody>
           </p:sp>
         </mc:Choice>
-        <mc:Fallback>
+        <mc:Fallback xmlns="">
           <p:sp>
             <p:nvSpPr>
               <p:cNvPr id="3" name="TextBox 2">
@@ -15579,7 +15650,7 @@
       </p:par>
     </p:tnLst>
     <p:bldLst>
-      <p:bldP spid="3" grpId="0"/>
+      <p:bldP spid="3" grpId="0" animBg="1"/>
     </p:bldLst>
   </p:timing>
 </p:sld>
@@ -15663,8 +15734,8 @@
           </a:p>
         </p:txBody>
       </p:sp>
-      <mc:AlternateContent xmlns:mc="http://schemas.openxmlformats.org/markup-compatibility/2006">
-        <mc:Choice xmlns:a14="http://schemas.microsoft.com/office/drawing/2010/main" Requires="a14">
+      <mc:AlternateContent xmlns:mc="http://schemas.openxmlformats.org/markup-compatibility/2006" xmlns:a14="http://schemas.microsoft.com/office/drawing/2010/main">
+        <mc:Choice Requires="a14">
           <p:sp>
             <p:nvSpPr>
               <p:cNvPr id="2" name="TextBox 1">
@@ -15780,7 +15851,7 @@
             </p:txBody>
           </p:sp>
         </mc:Choice>
-        <mc:Fallback>
+        <mc:Fallback xmlns="">
           <p:sp>
             <p:nvSpPr>
               <p:cNvPr id="2" name="TextBox 1">
@@ -16197,8 +16268,8 @@
           </p:spPr>
         </p:pic>
       </p:grpSp>
-      <mc:AlternateContent xmlns:mc="http://schemas.openxmlformats.org/markup-compatibility/2006">
-        <mc:Choice xmlns:a14="http://schemas.microsoft.com/office/drawing/2010/main" Requires="a14">
+      <mc:AlternateContent xmlns:mc="http://schemas.openxmlformats.org/markup-compatibility/2006" xmlns:a14="http://schemas.microsoft.com/office/drawing/2010/main">
+        <mc:Choice Requires="a14">
           <p:sp>
             <p:nvSpPr>
               <p:cNvPr id="34" name="TextBox 33">
@@ -16290,7 +16361,7 @@
             </p:txBody>
           </p:sp>
         </mc:Choice>
-        <mc:Fallback>
+        <mc:Fallback xmlns="">
           <p:sp>
             <p:nvSpPr>
               <p:cNvPr id="34" name="TextBox 33">
@@ -16335,8 +16406,8 @@
           </p:sp>
         </mc:Fallback>
       </mc:AlternateContent>
-      <mc:AlternateContent xmlns:mc="http://schemas.openxmlformats.org/markup-compatibility/2006">
-        <mc:Choice xmlns:a14="http://schemas.microsoft.com/office/drawing/2010/main" Requires="a14">
+      <mc:AlternateContent xmlns:mc="http://schemas.openxmlformats.org/markup-compatibility/2006" xmlns:a14="http://schemas.microsoft.com/office/drawing/2010/main">
+        <mc:Choice Requires="a14">
           <p:sp>
             <p:nvSpPr>
               <p:cNvPr id="35" name="TextBox 34">
@@ -16428,7 +16499,7 @@
             </p:txBody>
           </p:sp>
         </mc:Choice>
-        <mc:Fallback>
+        <mc:Fallback xmlns="">
           <p:sp>
             <p:nvSpPr>
               <p:cNvPr id="35" name="TextBox 34">
@@ -16473,8 +16544,8 @@
           </p:sp>
         </mc:Fallback>
       </mc:AlternateContent>
-      <mc:AlternateContent xmlns:mc="http://schemas.openxmlformats.org/markup-compatibility/2006">
-        <mc:Choice xmlns:a14="http://schemas.microsoft.com/office/drawing/2010/main" Requires="a14">
+      <mc:AlternateContent xmlns:mc="http://schemas.openxmlformats.org/markup-compatibility/2006" xmlns:a14="http://schemas.microsoft.com/office/drawing/2010/main">
+        <mc:Choice Requires="a14">
           <p:sp>
             <p:nvSpPr>
               <p:cNvPr id="36" name="TextBox 35">
@@ -16566,7 +16637,7 @@
             </p:txBody>
           </p:sp>
         </mc:Choice>
-        <mc:Fallback>
+        <mc:Fallback xmlns="">
           <p:sp>
             <p:nvSpPr>
               <p:cNvPr id="36" name="TextBox 35">
@@ -16611,8 +16682,8 @@
           </p:sp>
         </mc:Fallback>
       </mc:AlternateContent>
-      <mc:AlternateContent xmlns:mc="http://schemas.openxmlformats.org/markup-compatibility/2006">
-        <mc:Choice xmlns:a14="http://schemas.microsoft.com/office/drawing/2010/main" Requires="a14">
+      <mc:AlternateContent xmlns:mc="http://schemas.openxmlformats.org/markup-compatibility/2006" xmlns:a14="http://schemas.microsoft.com/office/drawing/2010/main">
+        <mc:Choice Requires="a14">
           <p:sp>
             <p:nvSpPr>
               <p:cNvPr id="37" name="TextBox 36">
@@ -16704,7 +16775,7 @@
             </p:txBody>
           </p:sp>
         </mc:Choice>
-        <mc:Fallback>
+        <mc:Fallback xmlns="">
           <p:sp>
             <p:nvSpPr>
               <p:cNvPr id="37" name="TextBox 36">
@@ -16880,8 +16951,8 @@
           <a:chExt cx="0" cy="0"/>
         </a:xfrm>
       </p:grpSpPr>
-      <mc:AlternateContent xmlns:mc="http://schemas.openxmlformats.org/markup-compatibility/2006">
-        <mc:Choice xmlns:a14="http://schemas.microsoft.com/office/drawing/2010/main" Requires="a14">
+      <mc:AlternateContent xmlns:mc="http://schemas.openxmlformats.org/markup-compatibility/2006" xmlns:a14="http://schemas.microsoft.com/office/drawing/2010/main">
+        <mc:Choice Requires="a14">
           <p:sp>
             <p:nvSpPr>
               <p:cNvPr id="2" name="TextBox 1">
@@ -17015,7 +17086,7 @@
             </p:txBody>
           </p:sp>
         </mc:Choice>
-        <mc:Fallback>
+        <mc:Fallback xmlns="">
           <p:sp>
             <p:nvSpPr>
               <p:cNvPr id="2" name="TextBox 1">
@@ -17430,8 +17501,8 @@
             </p:spPr>
           </p:pic>
         </p:grpSp>
-        <mc:AlternateContent xmlns:mc="http://schemas.openxmlformats.org/markup-compatibility/2006">
-          <mc:Choice xmlns:a14="http://schemas.microsoft.com/office/drawing/2010/main" Requires="a14">
+        <mc:AlternateContent xmlns:mc="http://schemas.openxmlformats.org/markup-compatibility/2006" xmlns:a14="http://schemas.microsoft.com/office/drawing/2010/main">
+          <mc:Choice Requires="a14">
             <p:sp>
               <p:nvSpPr>
                 <p:cNvPr id="17" name="TextBox 16">
@@ -17523,7 +17594,7 @@
               </p:txBody>
             </p:sp>
           </mc:Choice>
-          <mc:Fallback>
+          <mc:Fallback xmlns="">
             <p:sp>
               <p:nvSpPr>
                 <p:cNvPr id="17" name="TextBox 16">
@@ -17568,8 +17639,8 @@
             </p:sp>
           </mc:Fallback>
         </mc:AlternateContent>
-        <mc:AlternateContent xmlns:mc="http://schemas.openxmlformats.org/markup-compatibility/2006">
-          <mc:Choice xmlns:a14="http://schemas.microsoft.com/office/drawing/2010/main" Requires="a14">
+        <mc:AlternateContent xmlns:mc="http://schemas.openxmlformats.org/markup-compatibility/2006" xmlns:a14="http://schemas.microsoft.com/office/drawing/2010/main">
+          <mc:Choice Requires="a14">
             <p:sp>
               <p:nvSpPr>
                 <p:cNvPr id="18" name="TextBox 17">
@@ -17661,7 +17732,7 @@
               </p:txBody>
             </p:sp>
           </mc:Choice>
-          <mc:Fallback>
+          <mc:Fallback xmlns="">
             <p:sp>
               <p:nvSpPr>
                 <p:cNvPr id="18" name="TextBox 17">
@@ -17706,8 +17777,8 @@
             </p:sp>
           </mc:Fallback>
         </mc:AlternateContent>
-        <mc:AlternateContent xmlns:mc="http://schemas.openxmlformats.org/markup-compatibility/2006">
-          <mc:Choice xmlns:a14="http://schemas.microsoft.com/office/drawing/2010/main" Requires="a14">
+        <mc:AlternateContent xmlns:mc="http://schemas.openxmlformats.org/markup-compatibility/2006" xmlns:a14="http://schemas.microsoft.com/office/drawing/2010/main">
+          <mc:Choice Requires="a14">
             <p:sp>
               <p:nvSpPr>
                 <p:cNvPr id="19" name="TextBox 18">
@@ -17799,7 +17870,7 @@
               </p:txBody>
             </p:sp>
           </mc:Choice>
-          <mc:Fallback>
+          <mc:Fallback xmlns="">
             <p:sp>
               <p:nvSpPr>
                 <p:cNvPr id="19" name="TextBox 18">
@@ -17844,8 +17915,8 @@
             </p:sp>
           </mc:Fallback>
         </mc:AlternateContent>
-        <mc:AlternateContent xmlns:mc="http://schemas.openxmlformats.org/markup-compatibility/2006">
-          <mc:Choice xmlns:a14="http://schemas.microsoft.com/office/drawing/2010/main" Requires="a14">
+        <mc:AlternateContent xmlns:mc="http://schemas.openxmlformats.org/markup-compatibility/2006" xmlns:a14="http://schemas.microsoft.com/office/drawing/2010/main">
+          <mc:Choice Requires="a14">
             <p:sp>
               <p:nvSpPr>
                 <p:cNvPr id="20" name="TextBox 19">
@@ -17937,7 +18008,7 @@
               </p:txBody>
             </p:sp>
           </mc:Choice>
-          <mc:Fallback>
+          <mc:Fallback xmlns="">
             <p:sp>
               <p:nvSpPr>
                 <p:cNvPr id="20" name="TextBox 19">
@@ -18067,8 +18138,8 @@
           <a:chExt cx="0" cy="0"/>
         </a:xfrm>
       </p:grpSpPr>
-      <mc:AlternateContent xmlns:mc="http://schemas.openxmlformats.org/markup-compatibility/2006">
-        <mc:Choice xmlns:a14="http://schemas.microsoft.com/office/drawing/2010/main" Requires="a14">
+      <mc:AlternateContent xmlns:mc="http://schemas.openxmlformats.org/markup-compatibility/2006" xmlns:a14="http://schemas.microsoft.com/office/drawing/2010/main">
+        <mc:Choice Requires="a14">
           <p:sp>
             <p:nvSpPr>
               <p:cNvPr id="2" name="TextBox 1">
@@ -18178,7 +18249,7 @@
             </p:txBody>
           </p:sp>
         </mc:Choice>
-        <mc:Fallback>
+        <mc:Fallback xmlns="">
           <p:sp>
             <p:nvSpPr>
               <p:cNvPr id="2" name="TextBox 1">
@@ -18565,8 +18636,8 @@
           </p:spPr>
         </p:pic>
       </p:grpSp>
-      <mc:AlternateContent xmlns:mc="http://schemas.openxmlformats.org/markup-compatibility/2006">
-        <mc:Choice xmlns:a14="http://schemas.microsoft.com/office/drawing/2010/main" Requires="a14">
+      <mc:AlternateContent xmlns:mc="http://schemas.openxmlformats.org/markup-compatibility/2006" xmlns:a14="http://schemas.microsoft.com/office/drawing/2010/main">
+        <mc:Choice Requires="a14">
           <p:sp>
             <p:nvSpPr>
               <p:cNvPr id="17" name="TextBox 16">
@@ -18658,7 +18729,7 @@
             </p:txBody>
           </p:sp>
         </mc:Choice>
-        <mc:Fallback>
+        <mc:Fallback xmlns="">
           <p:sp>
             <p:nvSpPr>
               <p:cNvPr id="17" name="TextBox 16">
@@ -18703,8 +18774,8 @@
           </p:sp>
         </mc:Fallback>
       </mc:AlternateContent>
-      <mc:AlternateContent xmlns:mc="http://schemas.openxmlformats.org/markup-compatibility/2006">
-        <mc:Choice xmlns:a14="http://schemas.microsoft.com/office/drawing/2010/main" Requires="a14">
+      <mc:AlternateContent xmlns:mc="http://schemas.openxmlformats.org/markup-compatibility/2006" xmlns:a14="http://schemas.microsoft.com/office/drawing/2010/main">
+        <mc:Choice Requires="a14">
           <p:sp>
             <p:nvSpPr>
               <p:cNvPr id="18" name="TextBox 17">
@@ -18796,7 +18867,7 @@
             </p:txBody>
           </p:sp>
         </mc:Choice>
-        <mc:Fallback>
+        <mc:Fallback xmlns="">
           <p:sp>
             <p:nvSpPr>
               <p:cNvPr id="18" name="TextBox 17">
@@ -18841,8 +18912,8 @@
           </p:sp>
         </mc:Fallback>
       </mc:AlternateContent>
-      <mc:AlternateContent xmlns:mc="http://schemas.openxmlformats.org/markup-compatibility/2006">
-        <mc:Choice xmlns:a14="http://schemas.microsoft.com/office/drawing/2010/main" Requires="a14">
+      <mc:AlternateContent xmlns:mc="http://schemas.openxmlformats.org/markup-compatibility/2006" xmlns:a14="http://schemas.microsoft.com/office/drawing/2010/main">
+        <mc:Choice Requires="a14">
           <p:sp>
             <p:nvSpPr>
               <p:cNvPr id="19" name="TextBox 18">
@@ -18934,7 +19005,7 @@
             </p:txBody>
           </p:sp>
         </mc:Choice>
-        <mc:Fallback>
+        <mc:Fallback xmlns="">
           <p:sp>
             <p:nvSpPr>
               <p:cNvPr id="19" name="TextBox 18">
@@ -18979,8 +19050,8 @@
           </p:sp>
         </mc:Fallback>
       </mc:AlternateContent>
-      <mc:AlternateContent xmlns:mc="http://schemas.openxmlformats.org/markup-compatibility/2006">
-        <mc:Choice xmlns:a14="http://schemas.microsoft.com/office/drawing/2010/main" Requires="a14">
+      <mc:AlternateContent xmlns:mc="http://schemas.openxmlformats.org/markup-compatibility/2006" xmlns:a14="http://schemas.microsoft.com/office/drawing/2010/main">
+        <mc:Choice Requires="a14">
           <p:sp>
             <p:nvSpPr>
               <p:cNvPr id="20" name="TextBox 19">
@@ -19072,7 +19143,7 @@
             </p:txBody>
           </p:sp>
         </mc:Choice>
-        <mc:Fallback>
+        <mc:Fallback xmlns="">
           <p:sp>
             <p:nvSpPr>
               <p:cNvPr id="20" name="TextBox 19">
@@ -19247,8 +19318,8 @@
           </a:p>
         </p:txBody>
       </p:sp>
-      <mc:AlternateContent xmlns:mc="http://schemas.openxmlformats.org/markup-compatibility/2006">
-        <mc:Choice xmlns:a14="http://schemas.microsoft.com/office/drawing/2010/main" Requires="a14">
+      <mc:AlternateContent xmlns:mc="http://schemas.openxmlformats.org/markup-compatibility/2006" xmlns:a14="http://schemas.microsoft.com/office/drawing/2010/main">
+        <mc:Choice Requires="a14">
           <p:sp>
             <p:nvSpPr>
               <p:cNvPr id="2" name="TextBox 1">
@@ -19431,7 +19502,7 @@
             </p:txBody>
           </p:sp>
         </mc:Choice>
-        <mc:Fallback>
+        <mc:Fallback xmlns="">
           <p:sp>
             <p:nvSpPr>
               <p:cNvPr id="2" name="TextBox 1">
@@ -19517,8 +19588,8 @@
           </a:p>
         </p:txBody>
       </p:sp>
-      <mc:AlternateContent xmlns:mc="http://schemas.openxmlformats.org/markup-compatibility/2006">
-        <mc:Choice xmlns:a14="http://schemas.microsoft.com/office/drawing/2010/main" Requires="a14">
+      <mc:AlternateContent xmlns:mc="http://schemas.openxmlformats.org/markup-compatibility/2006" xmlns:a14="http://schemas.microsoft.com/office/drawing/2010/main">
+        <mc:Choice Requires="a14">
           <p:sp>
             <p:nvSpPr>
               <p:cNvPr id="7" name="TextBox 6">
@@ -20103,7 +20174,7 @@
             </p:txBody>
           </p:sp>
         </mc:Choice>
-        <mc:Fallback>
+        <mc:Fallback xmlns="">
           <p:sp>
             <p:nvSpPr>
               <p:cNvPr id="7" name="TextBox 6">
@@ -20605,8 +20676,8 @@
           </a:p>
         </p:txBody>
       </p:sp>
-      <mc:AlternateContent xmlns:mc="http://schemas.openxmlformats.org/markup-compatibility/2006">
-        <mc:Choice xmlns:a14="http://schemas.microsoft.com/office/drawing/2010/main" Requires="a14">
+      <mc:AlternateContent xmlns:mc="http://schemas.openxmlformats.org/markup-compatibility/2006" xmlns:a14="http://schemas.microsoft.com/office/drawing/2010/main">
+        <mc:Choice Requires="a14">
           <p:sp>
             <p:nvSpPr>
               <p:cNvPr id="2" name="TextBox 1">
@@ -21028,7 +21099,7 @@
             </p:txBody>
           </p:sp>
         </mc:Choice>
-        <mc:Fallback>
+        <mc:Fallback xmlns="">
           <p:sp>
             <p:nvSpPr>
               <p:cNvPr id="2" name="TextBox 1">
@@ -21114,8 +21185,8 @@
           </a:p>
         </p:txBody>
       </p:sp>
-      <mc:AlternateContent xmlns:mc="http://schemas.openxmlformats.org/markup-compatibility/2006">
-        <mc:Choice xmlns:a14="http://schemas.microsoft.com/office/drawing/2010/main" Requires="a14">
+      <mc:AlternateContent xmlns:mc="http://schemas.openxmlformats.org/markup-compatibility/2006" xmlns:a14="http://schemas.microsoft.com/office/drawing/2010/main">
+        <mc:Choice Requires="a14">
           <p:sp>
             <p:nvSpPr>
               <p:cNvPr id="6" name="TextBox 5">
@@ -21312,7 +21383,7 @@
             </p:txBody>
           </p:sp>
         </mc:Choice>
-        <mc:Fallback>
+        <mc:Fallback xmlns="">
           <p:sp>
             <p:nvSpPr>
               <p:cNvPr id="6" name="TextBox 5">
@@ -21574,8 +21645,8 @@
           </a:p>
         </p:txBody>
       </p:sp>
-      <mc:AlternateContent xmlns:mc="http://schemas.openxmlformats.org/markup-compatibility/2006">
-        <mc:Choice xmlns:a14="http://schemas.microsoft.com/office/drawing/2010/main" Requires="a14">
+      <mc:AlternateContent xmlns:mc="http://schemas.openxmlformats.org/markup-compatibility/2006" xmlns:a14="http://schemas.microsoft.com/office/drawing/2010/main">
+        <mc:Choice Requires="a14">
           <p:sp>
             <p:nvSpPr>
               <p:cNvPr id="39" name="TextBox 38">
@@ -21664,7 +21735,7 @@
             </p:txBody>
           </p:sp>
         </mc:Choice>
-        <mc:Fallback>
+        <mc:Fallback xmlns="">
           <p:sp>
             <p:nvSpPr>
               <p:cNvPr id="39" name="TextBox 38">
@@ -23316,8 +23387,8 @@
           </a:p>
         </p:txBody>
       </p:sp>
-      <mc:AlternateContent xmlns:mc="http://schemas.openxmlformats.org/markup-compatibility/2006">
-        <mc:Choice xmlns:a14="http://schemas.microsoft.com/office/drawing/2010/main" Requires="a14">
+      <mc:AlternateContent xmlns:mc="http://schemas.openxmlformats.org/markup-compatibility/2006" xmlns:a14="http://schemas.microsoft.com/office/drawing/2010/main">
+        <mc:Choice Requires="a14">
           <p:sp>
             <p:nvSpPr>
               <p:cNvPr id="2" name="TextBox 1">
@@ -23739,7 +23810,7 @@
             </p:txBody>
           </p:sp>
         </mc:Choice>
-        <mc:Fallback>
+        <mc:Fallback xmlns="">
           <p:sp>
             <p:nvSpPr>
               <p:cNvPr id="2" name="TextBox 1">
@@ -23924,8 +23995,8 @@
           </a:p>
         </p:txBody>
       </p:sp>
-      <mc:AlternateContent xmlns:mc="http://schemas.openxmlformats.org/markup-compatibility/2006">
-        <mc:Choice xmlns:a14="http://schemas.microsoft.com/office/drawing/2010/main" Requires="a14">
+      <mc:AlternateContent xmlns:mc="http://schemas.openxmlformats.org/markup-compatibility/2006" xmlns:a14="http://schemas.microsoft.com/office/drawing/2010/main">
+        <mc:Choice Requires="a14">
           <p:sp>
             <p:nvSpPr>
               <p:cNvPr id="2" name="TextBox 1">
@@ -24347,7 +24418,7 @@
             </p:txBody>
           </p:sp>
         </mc:Choice>
-        <mc:Fallback>
+        <mc:Fallback xmlns="">
           <p:sp>
             <p:nvSpPr>
               <p:cNvPr id="2" name="TextBox 1">
@@ -24433,8 +24504,8 @@
           </a:p>
         </p:txBody>
       </p:sp>
-      <mc:AlternateContent xmlns:mc="http://schemas.openxmlformats.org/markup-compatibility/2006">
-        <mc:Choice xmlns:a14="http://schemas.microsoft.com/office/drawing/2010/main" Requires="a14">
+      <mc:AlternateContent xmlns:mc="http://schemas.openxmlformats.org/markup-compatibility/2006" xmlns:a14="http://schemas.microsoft.com/office/drawing/2010/main">
+        <mc:Choice Requires="a14">
           <p:sp>
             <p:nvSpPr>
               <p:cNvPr id="5" name="TextBox 4">
@@ -24513,6 +24584,7 @@
                 </a:endParaRPr>
               </a:p>
               <a:p>
+                <a:pPr/>
                 <a14:m>
                   <m:oMathPara xmlns:m="http://schemas.openxmlformats.org/officeDocument/2006/math">
                     <m:oMathParaPr>
@@ -24585,7 +24657,7 @@
             </p:txBody>
           </p:sp>
         </mc:Choice>
-        <mc:Fallback>
+        <mc:Fallback xmlns="">
           <p:sp>
             <p:nvSpPr>
               <p:cNvPr id="5" name="TextBox 4">
@@ -24633,8 +24705,8 @@
           </p:sp>
         </mc:Fallback>
       </mc:AlternateContent>
-      <mc:AlternateContent xmlns:mc="http://schemas.openxmlformats.org/markup-compatibility/2006">
-        <mc:Choice xmlns:a14="http://schemas.microsoft.com/office/drawing/2010/main" Requires="a14">
+      <mc:AlternateContent xmlns:mc="http://schemas.openxmlformats.org/markup-compatibility/2006" xmlns:a14="http://schemas.microsoft.com/office/drawing/2010/main">
+        <mc:Choice Requires="a14">
           <p:sp>
             <p:nvSpPr>
               <p:cNvPr id="7" name="TextBox 6">
@@ -24858,7 +24930,7 @@
             </p:txBody>
           </p:sp>
         </mc:Choice>
-        <mc:Fallback>
+        <mc:Fallback xmlns="">
           <p:sp>
             <p:nvSpPr>
               <p:cNvPr id="7" name="TextBox 6">
@@ -25035,8 +25107,8 @@
           </a:p>
         </p:txBody>
       </p:sp>
-      <mc:AlternateContent xmlns:mc="http://schemas.openxmlformats.org/markup-compatibility/2006">
-        <mc:Choice xmlns:a14="http://schemas.microsoft.com/office/drawing/2010/main" Requires="a14">
+      <mc:AlternateContent xmlns:mc="http://schemas.openxmlformats.org/markup-compatibility/2006" xmlns:a14="http://schemas.microsoft.com/office/drawing/2010/main">
+        <mc:Choice Requires="a14">
           <p:sp>
             <p:nvSpPr>
               <p:cNvPr id="5" name="TextBox 4">
@@ -25311,7 +25383,7 @@
             </p:txBody>
           </p:sp>
         </mc:Choice>
-        <mc:Fallback>
+        <mc:Fallback xmlns="">
           <p:sp>
             <p:nvSpPr>
               <p:cNvPr id="5" name="TextBox 4">
@@ -25450,8 +25522,8 @@
           </a:p>
         </p:txBody>
       </p:sp>
-      <mc:AlternateContent xmlns:mc="http://schemas.openxmlformats.org/markup-compatibility/2006">
-        <mc:Choice xmlns:a14="http://schemas.microsoft.com/office/drawing/2010/main" Requires="a14">
+      <mc:AlternateContent xmlns:mc="http://schemas.openxmlformats.org/markup-compatibility/2006" xmlns:a14="http://schemas.microsoft.com/office/drawing/2010/main">
+        <mc:Choice Requires="a14">
           <p:sp>
             <p:nvSpPr>
               <p:cNvPr id="2" name="TextBox 1">
@@ -25873,7 +25945,7 @@
             </p:txBody>
           </p:sp>
         </mc:Choice>
-        <mc:Fallback>
+        <mc:Fallback xmlns="">
           <p:sp>
             <p:nvSpPr>
               <p:cNvPr id="2" name="TextBox 1">
@@ -25959,8 +26031,8 @@
           </a:p>
         </p:txBody>
       </p:sp>
-      <mc:AlternateContent xmlns:mc="http://schemas.openxmlformats.org/markup-compatibility/2006">
-        <mc:Choice xmlns:a14="http://schemas.microsoft.com/office/drawing/2010/main" Requires="a14">
+      <mc:AlternateContent xmlns:mc="http://schemas.openxmlformats.org/markup-compatibility/2006" xmlns:a14="http://schemas.microsoft.com/office/drawing/2010/main">
+        <mc:Choice Requires="a14">
           <p:sp>
             <p:nvSpPr>
               <p:cNvPr id="5" name="TextBox 4">
@@ -26235,7 +26307,7 @@
             </p:txBody>
           </p:sp>
         </mc:Choice>
-        <mc:Fallback>
+        <mc:Fallback xmlns="">
           <p:sp>
             <p:nvSpPr>
               <p:cNvPr id="5" name="TextBox 4">
@@ -26283,8 +26355,8 @@
           </p:sp>
         </mc:Fallback>
       </mc:AlternateContent>
-      <mc:AlternateContent xmlns:mc="http://schemas.openxmlformats.org/markup-compatibility/2006">
-        <mc:Choice xmlns:a14="http://schemas.microsoft.com/office/drawing/2010/main" Requires="a14">
+      <mc:AlternateContent xmlns:mc="http://schemas.openxmlformats.org/markup-compatibility/2006" xmlns:a14="http://schemas.microsoft.com/office/drawing/2010/main">
+        <mc:Choice Requires="a14">
           <p:sp>
             <p:nvSpPr>
               <p:cNvPr id="7" name="TextBox 6">
@@ -26559,7 +26631,7 @@
             </p:txBody>
           </p:sp>
         </mc:Choice>
-        <mc:Fallback>
+        <mc:Fallback xmlns="">
           <p:sp>
             <p:nvSpPr>
               <p:cNvPr id="7" name="TextBox 6">
@@ -26734,8 +26806,8 @@
           </a:p>
         </p:txBody>
       </p:sp>
-      <mc:AlternateContent xmlns:mc="http://schemas.openxmlformats.org/markup-compatibility/2006">
-        <mc:Choice xmlns:a14="http://schemas.microsoft.com/office/drawing/2010/main" Requires="a14">
+      <mc:AlternateContent xmlns:mc="http://schemas.openxmlformats.org/markup-compatibility/2006" xmlns:a14="http://schemas.microsoft.com/office/drawing/2010/main">
+        <mc:Choice Requires="a14">
           <p:sp>
             <p:nvSpPr>
               <p:cNvPr id="39" name="TextBox 38">
@@ -26824,7 +26896,7 @@
             </p:txBody>
           </p:sp>
         </mc:Choice>
-        <mc:Fallback>
+        <mc:Fallback xmlns="">
           <p:sp>
             <p:nvSpPr>
               <p:cNvPr id="39" name="TextBox 38">
@@ -28107,8 +28179,8 @@
           </a:p>
         </p:txBody>
       </p:sp>
-      <mc:AlternateContent xmlns:mc="http://schemas.openxmlformats.org/markup-compatibility/2006">
-        <mc:Choice xmlns:a14="http://schemas.microsoft.com/office/drawing/2010/main" Requires="a14">
+      <mc:AlternateContent xmlns:mc="http://schemas.openxmlformats.org/markup-compatibility/2006" xmlns:a14="http://schemas.microsoft.com/office/drawing/2010/main">
+        <mc:Choice Requires="a14">
           <p:sp>
             <p:nvSpPr>
               <p:cNvPr id="39" name="TextBox 38">
@@ -28187,13 +28259,7 @@
                         <a:rPr lang="en-GB" sz="4000" b="0" i="1" smtClean="0">
                           <a:latin typeface="Cambria Math" panose="02040503050406030204" pitchFamily="18" charset="0"/>
                         </a:rPr>
-                        <m:t>)</m:t>
-                      </m:r>
-                      <m:r>
-                        <a:rPr lang="en-GB" sz="4000" b="0" i="1" smtClean="0">
-                          <a:latin typeface="Cambria Math" panose="02040503050406030204" pitchFamily="18" charset="0"/>
-                        </a:rPr>
-                        <m:t>= </m:t>
+                        <m:t>)= </m:t>
                       </m:r>
                     </m:oMath>
                   </m:oMathPara>
@@ -28203,7 +28269,7 @@
             </p:txBody>
           </p:sp>
         </mc:Choice>
-        <mc:Fallback>
+        <mc:Fallback xmlns="">
           <p:sp>
             <p:nvSpPr>
               <p:cNvPr id="39" name="TextBox 38">
@@ -28864,8 +28930,8 @@
           </a:p>
         </p:txBody>
       </p:sp>
-      <mc:AlternateContent xmlns:mc="http://schemas.openxmlformats.org/markup-compatibility/2006">
-        <mc:Choice xmlns:a14="http://schemas.microsoft.com/office/drawing/2010/main" Requires="a14">
+      <mc:AlternateContent xmlns:mc="http://schemas.openxmlformats.org/markup-compatibility/2006" xmlns:a14="http://schemas.microsoft.com/office/drawing/2010/main">
+        <mc:Choice Requires="a14">
           <p:sp>
             <p:nvSpPr>
               <p:cNvPr id="2" name="TextBox 1">
@@ -28894,6 +28960,7 @@
               </a:bodyPr>
               <a:lstStyle/>
               <a:p>
+                <a:pPr/>
                 <a14:m>
                   <m:oMathPara xmlns:m="http://schemas.openxmlformats.org/officeDocument/2006/math">
                     <m:oMathParaPr>
@@ -28914,7 +28981,7 @@
             </p:txBody>
           </p:sp>
         </mc:Choice>
-        <mc:Fallback>
+        <mc:Fallback xmlns="">
           <p:sp>
             <p:nvSpPr>
               <p:cNvPr id="2" name="TextBox 1">
@@ -28959,8 +29026,8 @@
           </p:sp>
         </mc:Fallback>
       </mc:AlternateContent>
-      <mc:AlternateContent xmlns:mc="http://schemas.openxmlformats.org/markup-compatibility/2006">
-        <mc:Choice xmlns:a14="http://schemas.microsoft.com/office/drawing/2010/main" Requires="a14">
+      <mc:AlternateContent xmlns:mc="http://schemas.openxmlformats.org/markup-compatibility/2006" xmlns:a14="http://schemas.microsoft.com/office/drawing/2010/main">
+        <mc:Choice Requires="a14">
           <p:sp>
             <p:nvSpPr>
               <p:cNvPr id="3" name="TextBox 2">
@@ -28989,6 +29056,7 @@
               </a:bodyPr>
               <a:lstStyle/>
               <a:p>
+                <a:pPr/>
                 <a14:m>
                   <m:oMathPara xmlns:m="http://schemas.openxmlformats.org/officeDocument/2006/math">
                     <m:oMathParaPr>
@@ -29009,7 +29077,7 @@
             </p:txBody>
           </p:sp>
         </mc:Choice>
-        <mc:Fallback>
+        <mc:Fallback xmlns="">
           <p:sp>
             <p:nvSpPr>
               <p:cNvPr id="3" name="TextBox 2">
@@ -29054,8 +29122,8 @@
           </p:sp>
         </mc:Fallback>
       </mc:AlternateContent>
-      <mc:AlternateContent xmlns:mc="http://schemas.openxmlformats.org/markup-compatibility/2006">
-        <mc:Choice xmlns:a14="http://schemas.microsoft.com/office/drawing/2010/main" Requires="a14">
+      <mc:AlternateContent xmlns:mc="http://schemas.openxmlformats.org/markup-compatibility/2006" xmlns:a14="http://schemas.microsoft.com/office/drawing/2010/main">
+        <mc:Choice Requires="a14">
           <p:sp>
             <p:nvSpPr>
               <p:cNvPr id="5" name="TextBox 4">
@@ -29084,6 +29152,7 @@
               </a:bodyPr>
               <a:lstStyle/>
               <a:p>
+                <a:pPr/>
                 <a14:m>
                   <m:oMathPara xmlns:m="http://schemas.openxmlformats.org/officeDocument/2006/math">
                     <m:oMathParaPr>
@@ -29104,7 +29173,7 @@
             </p:txBody>
           </p:sp>
         </mc:Choice>
-        <mc:Fallback>
+        <mc:Fallback xmlns="">
           <p:sp>
             <p:nvSpPr>
               <p:cNvPr id="5" name="TextBox 4">
@@ -29593,8 +29662,8 @@
           </a:p>
         </p:txBody>
       </p:sp>
-      <mc:AlternateContent xmlns:mc="http://schemas.openxmlformats.org/markup-compatibility/2006">
-        <mc:Choice xmlns:a14="http://schemas.microsoft.com/office/drawing/2010/main" Requires="a14">
+      <mc:AlternateContent xmlns:mc="http://schemas.openxmlformats.org/markup-compatibility/2006" xmlns:a14="http://schemas.microsoft.com/office/drawing/2010/main">
+        <mc:Choice Requires="a14">
           <p:sp>
             <p:nvSpPr>
               <p:cNvPr id="39" name="TextBox 38">
@@ -29683,7 +29752,7 @@
             </p:txBody>
           </p:sp>
         </mc:Choice>
-        <mc:Fallback>
+        <mc:Fallback xmlns="">
           <p:sp>
             <p:nvSpPr>
               <p:cNvPr id="39" name="TextBox 38">
@@ -30576,42 +30645,6 @@
           </a:solidFill>
         </p:spPr>
       </p:pic>
-      <p:pic>
-        <p:nvPicPr>
-          <p:cNvPr id="12" name="Picture 11" descr="A black and white dice&#10;&#10;Description automatically generated">
-            <a:extLst>
-              <a:ext uri="{FF2B5EF4-FFF2-40B4-BE49-F238E27FC236}">
-                <a16:creationId xmlns:a16="http://schemas.microsoft.com/office/drawing/2014/main" id="{8F9D63E7-2E79-5DD3-8C51-F1993396E9A5}"/>
-              </a:ext>
-            </a:extLst>
-          </p:cNvPr>
-          <p:cNvPicPr>
-            <a:picLocks noChangeAspect="1"/>
-          </p:cNvPicPr>
-          <p:nvPr/>
-        </p:nvPicPr>
-        <p:blipFill>
-          <a:blip r:embed="rId8">
-            <a:extLst>
-              <a:ext uri="{28A0092B-C50C-407E-A947-70E740481C1C}">
-                <a14:useLocalDpi xmlns:a14="http://schemas.microsoft.com/office/drawing/2010/main" val="0"/>
-              </a:ext>
-            </a:extLst>
-          </a:blip>
-          <a:stretch>
-            <a:fillRect/>
-          </a:stretch>
-        </p:blipFill>
-        <p:spPr>
-          <a:xfrm>
-            <a:off x="7075494" y="3766936"/>
-            <a:ext cx="720000" cy="720000"/>
-          </a:xfrm>
-          <a:prstGeom prst="rect">
-            <a:avLst/>
-          </a:prstGeom>
-        </p:spPr>
-      </p:pic>
       <p:sp>
         <p:nvSpPr>
           <p:cNvPr id="13" name="Oval 12">
@@ -30664,8 +30697,8 @@
           </a:p>
         </p:txBody>
       </p:sp>
-      <mc:AlternateContent xmlns:mc="http://schemas.openxmlformats.org/markup-compatibility/2006">
-        <mc:Choice xmlns:a14="http://schemas.microsoft.com/office/drawing/2010/main" Requires="a14">
+      <mc:AlternateContent xmlns:mc="http://schemas.openxmlformats.org/markup-compatibility/2006" xmlns:a14="http://schemas.microsoft.com/office/drawing/2010/main">
+        <mc:Choice Requires="a14">
           <p:sp>
             <p:nvSpPr>
               <p:cNvPr id="16" name="TextBox 15">
@@ -30745,7 +30778,7 @@
             </p:txBody>
           </p:sp>
         </mc:Choice>
-        <mc:Fallback>
+        <mc:Fallback xmlns="">
           <p:sp>
             <p:nvSpPr>
               <p:cNvPr id="16" name="TextBox 15">
@@ -30790,8 +30823,8 @@
           </p:sp>
         </mc:Fallback>
       </mc:AlternateContent>
-      <mc:AlternateContent xmlns:mc="http://schemas.openxmlformats.org/markup-compatibility/2006">
-        <mc:Choice xmlns:a14="http://schemas.microsoft.com/office/drawing/2010/main" Requires="a14">
+      <mc:AlternateContent xmlns:mc="http://schemas.openxmlformats.org/markup-compatibility/2006" xmlns:a14="http://schemas.microsoft.com/office/drawing/2010/main">
+        <mc:Choice Requires="a14">
           <p:sp>
             <p:nvSpPr>
               <p:cNvPr id="17" name="TextBox 16">
@@ -30875,7 +30908,7 @@
             </p:txBody>
           </p:sp>
         </mc:Choice>
-        <mc:Fallback>
+        <mc:Fallback xmlns="">
           <p:sp>
             <p:nvSpPr>
               <p:cNvPr id="17" name="TextBox 16">
@@ -30920,8 +30953,8 @@
           </p:sp>
         </mc:Fallback>
       </mc:AlternateContent>
-      <mc:AlternateContent xmlns:mc="http://schemas.openxmlformats.org/markup-compatibility/2006">
-        <mc:Choice xmlns:a14="http://schemas.microsoft.com/office/drawing/2010/main" Requires="a14">
+      <mc:AlternateContent xmlns:mc="http://schemas.openxmlformats.org/markup-compatibility/2006" xmlns:a14="http://schemas.microsoft.com/office/drawing/2010/main">
+        <mc:Choice Requires="a14">
           <p:sp>
             <p:nvSpPr>
               <p:cNvPr id="19" name="TextBox 18">
@@ -31076,7 +31109,7 @@
             </p:txBody>
           </p:sp>
         </mc:Choice>
-        <mc:Fallback>
+        <mc:Fallback xmlns="">
           <p:sp>
             <p:nvSpPr>
               <p:cNvPr id="19" name="TextBox 18">
@@ -31121,6 +31154,42 @@
           </p:sp>
         </mc:Fallback>
       </mc:AlternateContent>
+      <p:pic>
+        <p:nvPicPr>
+          <p:cNvPr id="3" name="Picture 2" descr="A black and white dice with black dots&#10;&#10;Description automatically generated">
+            <a:extLst>
+              <a:ext uri="{FF2B5EF4-FFF2-40B4-BE49-F238E27FC236}">
+                <a16:creationId xmlns:a16="http://schemas.microsoft.com/office/drawing/2014/main" id="{FAED2E31-5378-D64B-AE27-57FA2534B659}"/>
+              </a:ext>
+            </a:extLst>
+          </p:cNvPr>
+          <p:cNvPicPr>
+            <a:picLocks noChangeAspect="1"/>
+          </p:cNvPicPr>
+          <p:nvPr/>
+        </p:nvPicPr>
+        <p:blipFill>
+          <a:blip r:embed="rId12">
+            <a:extLst>
+              <a:ext uri="{28A0092B-C50C-407E-A947-70E740481C1C}">
+                <a14:useLocalDpi xmlns:a14="http://schemas.microsoft.com/office/drawing/2010/main" val="0"/>
+              </a:ext>
+            </a:extLst>
+          </a:blip>
+          <a:stretch>
+            <a:fillRect/>
+          </a:stretch>
+        </p:blipFill>
+        <p:spPr>
+          <a:xfrm>
+            <a:off x="6937782" y="3766854"/>
+            <a:ext cx="723600" cy="723600"/>
+          </a:xfrm>
+          <a:prstGeom prst="rect">
+            <a:avLst/>
+          </a:prstGeom>
+        </p:spPr>
+      </p:pic>
     </p:spTree>
     <p:extLst>
       <p:ext uri="{BB962C8B-B14F-4D97-AF65-F5344CB8AC3E}">
@@ -31292,7 +31361,7 @@
                                 </p:cTn>
                               </p:par>
                               <p:par>
-                                <p:cTn id="17" presetID="9" presetClass="entr" presetSubtype="0" fill="hold" nodeType="withEffect">
+                                <p:cTn id="17" presetID="9" presetClass="entr" presetSubtype="0" fill="hold" grpId="0" nodeType="withEffect">
                                   <p:stCondLst>
                                     <p:cond delay="0"/>
                                   </p:stCondLst>
@@ -31305,7 +31374,7 @@
                                           </p:stCondLst>
                                         </p:cTn>
                                         <p:tgtEl>
-                                          <p:spTgt spid="12"/>
+                                          <p:spTgt spid="13"/>
                                         </p:tgtEl>
                                         <p:attrNameLst>
                                           <p:attrName>style.visibility</p:attrName>
@@ -31319,7 +31388,7 @@
                                       <p:cBhvr>
                                         <p:cTn id="19" dur="500"/>
                                         <p:tgtEl>
-                                          <p:spTgt spid="12"/>
+                                          <p:spTgt spid="13"/>
                                         </p:tgtEl>
                                       </p:cBhvr>
                                     </p:animEffect>
@@ -31340,7 +31409,7 @@
                                           </p:stCondLst>
                                         </p:cTn>
                                         <p:tgtEl>
-                                          <p:spTgt spid="13"/>
+                                          <p:spTgt spid="16"/>
                                         </p:tgtEl>
                                         <p:attrNameLst>
                                           <p:attrName>style.visibility</p:attrName>
@@ -31354,7 +31423,7 @@
                                       <p:cBhvr>
                                         <p:cTn id="22" dur="500"/>
                                         <p:tgtEl>
-                                          <p:spTgt spid="13"/>
+                                          <p:spTgt spid="16"/>
                                         </p:tgtEl>
                                       </p:cBhvr>
                                     </p:animEffect>
@@ -31375,7 +31444,7 @@
                                           </p:stCondLst>
                                         </p:cTn>
                                         <p:tgtEl>
-                                          <p:spTgt spid="16"/>
+                                          <p:spTgt spid="17"/>
                                         </p:tgtEl>
                                         <p:attrNameLst>
                                           <p:attrName>style.visibility</p:attrName>
@@ -31389,28 +31458,46 @@
                                       <p:cBhvr>
                                         <p:cTn id="25" dur="500"/>
                                         <p:tgtEl>
-                                          <p:spTgt spid="16"/>
+                                          <p:spTgt spid="17"/>
                                         </p:tgtEl>
                                       </p:cBhvr>
                                     </p:animEffect>
                                   </p:childTnLst>
                                 </p:cTn>
                               </p:par>
+                            </p:childTnLst>
+                          </p:cTn>
+                        </p:par>
+                      </p:childTnLst>
+                    </p:cTn>
+                  </p:par>
+                  <p:par>
+                    <p:cTn id="26" fill="hold">
+                      <p:stCondLst>
+                        <p:cond delay="indefinite"/>
+                      </p:stCondLst>
+                      <p:childTnLst>
+                        <p:par>
+                          <p:cTn id="27" fill="hold">
+                            <p:stCondLst>
+                              <p:cond delay="0"/>
+                            </p:stCondLst>
+                            <p:childTnLst>
                               <p:par>
-                                <p:cTn id="26" presetID="9" presetClass="entr" presetSubtype="0" fill="hold" grpId="0" nodeType="withEffect">
+                                <p:cTn id="28" presetID="9" presetClass="entr" presetSubtype="0" fill="hold" nodeType="clickEffect">
                                   <p:stCondLst>
                                     <p:cond delay="0"/>
                                   </p:stCondLst>
                                   <p:childTnLst>
                                     <p:set>
                                       <p:cBhvr>
-                                        <p:cTn id="27" dur="1" fill="hold">
+                                        <p:cTn id="29" dur="1" fill="hold">
                                           <p:stCondLst>
                                             <p:cond delay="0"/>
                                           </p:stCondLst>
                                         </p:cTn>
                                         <p:tgtEl>
-                                          <p:spTgt spid="17"/>
+                                          <p:spTgt spid="3"/>
                                         </p:tgtEl>
                                         <p:attrNameLst>
                                           <p:attrName>style.visibility</p:attrName>
@@ -31422,9 +31509,9 @@
                                     </p:set>
                                     <p:animEffect transition="in" filter="dissolve">
                                       <p:cBhvr>
-                                        <p:cTn id="28" dur="500"/>
+                                        <p:cTn id="30" dur="500"/>
                                         <p:tgtEl>
-                                          <p:spTgt spid="17"/>
+                                          <p:spTgt spid="3"/>
                                         </p:tgtEl>
                                       </p:cBhvr>
                                     </p:animEffect>
@@ -31762,8 +31849,8 @@
           </a:prstGeom>
         </p:spPr>
       </p:pic>
-      <mc:AlternateContent xmlns:mc="http://schemas.openxmlformats.org/markup-compatibility/2006">
-        <mc:Choice xmlns:a14="http://schemas.microsoft.com/office/drawing/2010/main" Requires="a14">
+      <mc:AlternateContent xmlns:mc="http://schemas.openxmlformats.org/markup-compatibility/2006" xmlns:a14="http://schemas.microsoft.com/office/drawing/2010/main">
+        <mc:Choice Requires="a14">
           <p:sp>
             <p:nvSpPr>
               <p:cNvPr id="36" name="TextBox 35">
@@ -31845,7 +31932,7 @@
             </p:txBody>
           </p:sp>
         </mc:Choice>
-        <mc:Fallback>
+        <mc:Fallback xmlns="">
           <p:sp>
             <p:nvSpPr>
               <p:cNvPr id="36" name="TextBox 35">
@@ -31890,8 +31977,8 @@
           </p:sp>
         </mc:Fallback>
       </mc:AlternateContent>
-      <mc:AlternateContent xmlns:mc="http://schemas.openxmlformats.org/markup-compatibility/2006">
-        <mc:Choice xmlns:a14="http://schemas.microsoft.com/office/drawing/2010/main" Requires="a14">
+      <mc:AlternateContent xmlns:mc="http://schemas.openxmlformats.org/markup-compatibility/2006" xmlns:a14="http://schemas.microsoft.com/office/drawing/2010/main">
+        <mc:Choice Requires="a14">
           <p:sp>
             <p:nvSpPr>
               <p:cNvPr id="37" name="TextBox 36">
@@ -31973,7 +32060,7 @@
             </p:txBody>
           </p:sp>
         </mc:Choice>
-        <mc:Fallback>
+        <mc:Fallback xmlns="">
           <p:sp>
             <p:nvSpPr>
               <p:cNvPr id="37" name="TextBox 36">
@@ -32018,8 +32105,8 @@
           </p:sp>
         </mc:Fallback>
       </mc:AlternateContent>
-      <mc:AlternateContent xmlns:mc="http://schemas.openxmlformats.org/markup-compatibility/2006">
-        <mc:Choice xmlns:a14="http://schemas.microsoft.com/office/drawing/2010/main" Requires="a14">
+      <mc:AlternateContent xmlns:mc="http://schemas.openxmlformats.org/markup-compatibility/2006" xmlns:a14="http://schemas.microsoft.com/office/drawing/2010/main">
+        <mc:Choice Requires="a14">
           <p:sp>
             <p:nvSpPr>
               <p:cNvPr id="43" name="TextBox 42">
@@ -32101,7 +32188,7 @@
             </p:txBody>
           </p:sp>
         </mc:Choice>
-        <mc:Fallback>
+        <mc:Fallback xmlns="">
           <p:sp>
             <p:nvSpPr>
               <p:cNvPr id="43" name="TextBox 42">
@@ -32146,8 +32233,8 @@
           </p:sp>
         </mc:Fallback>
       </mc:AlternateContent>
-      <mc:AlternateContent xmlns:mc="http://schemas.openxmlformats.org/markup-compatibility/2006">
-        <mc:Choice xmlns:a14="http://schemas.microsoft.com/office/drawing/2010/main" Requires="a14">
+      <mc:AlternateContent xmlns:mc="http://schemas.openxmlformats.org/markup-compatibility/2006" xmlns:a14="http://schemas.microsoft.com/office/drawing/2010/main">
+        <mc:Choice Requires="a14">
           <p:sp>
             <p:nvSpPr>
               <p:cNvPr id="44" name="TextBox 43">
@@ -32229,7 +32316,7 @@
             </p:txBody>
           </p:sp>
         </mc:Choice>
-        <mc:Fallback>
+        <mc:Fallback xmlns="">
           <p:sp>
             <p:nvSpPr>
               <p:cNvPr id="44" name="TextBox 43">
@@ -32274,8 +32361,8 @@
           </p:sp>
         </mc:Fallback>
       </mc:AlternateContent>
-      <mc:AlternateContent xmlns:mc="http://schemas.openxmlformats.org/markup-compatibility/2006">
-        <mc:Choice xmlns:a14="http://schemas.microsoft.com/office/drawing/2010/main" Requires="a14">
+      <mc:AlternateContent xmlns:mc="http://schemas.openxmlformats.org/markup-compatibility/2006" xmlns:a14="http://schemas.microsoft.com/office/drawing/2010/main">
+        <mc:Choice Requires="a14">
           <p:sp>
             <p:nvSpPr>
               <p:cNvPr id="45" name="TextBox 44">
@@ -32357,7 +32444,7 @@
             </p:txBody>
           </p:sp>
         </mc:Choice>
-        <mc:Fallback>
+        <mc:Fallback xmlns="">
           <p:sp>
             <p:nvSpPr>
               <p:cNvPr id="45" name="TextBox 44">
@@ -32402,8 +32489,8 @@
           </p:sp>
         </mc:Fallback>
       </mc:AlternateContent>
-      <mc:AlternateContent xmlns:mc="http://schemas.openxmlformats.org/markup-compatibility/2006">
-        <mc:Choice xmlns:a14="http://schemas.microsoft.com/office/drawing/2010/main" Requires="a14">
+      <mc:AlternateContent xmlns:mc="http://schemas.openxmlformats.org/markup-compatibility/2006" xmlns:a14="http://schemas.microsoft.com/office/drawing/2010/main">
+        <mc:Choice Requires="a14">
           <p:sp>
             <p:nvSpPr>
               <p:cNvPr id="46" name="TextBox 45">
@@ -32485,7 +32572,7 @@
             </p:txBody>
           </p:sp>
         </mc:Choice>
-        <mc:Fallback>
+        <mc:Fallback xmlns="">
           <p:sp>
             <p:nvSpPr>
               <p:cNvPr id="46" name="TextBox 45">
@@ -33820,8 +33907,8 @@
           </a:p>
         </p:txBody>
       </p:sp>
-      <mc:AlternateContent xmlns:mc="http://schemas.openxmlformats.org/markup-compatibility/2006">
-        <mc:Choice xmlns:a14="http://schemas.microsoft.com/office/drawing/2010/main" Requires="a14">
+      <mc:AlternateContent xmlns:mc="http://schemas.openxmlformats.org/markup-compatibility/2006" xmlns:a14="http://schemas.microsoft.com/office/drawing/2010/main">
+        <mc:Choice Requires="a14">
           <p:sp>
             <p:nvSpPr>
               <p:cNvPr id="3" name="TextBox 2">
@@ -33903,7 +33990,7 @@
             </p:txBody>
           </p:sp>
         </mc:Choice>
-        <mc:Fallback>
+        <mc:Fallback xmlns="">
           <p:sp>
             <p:nvSpPr>
               <p:cNvPr id="3" name="TextBox 2">
@@ -33948,8 +34035,8 @@
           </p:sp>
         </mc:Fallback>
       </mc:AlternateContent>
-      <mc:AlternateContent xmlns:mc="http://schemas.openxmlformats.org/markup-compatibility/2006">
-        <mc:Choice xmlns:a14="http://schemas.microsoft.com/office/drawing/2010/main" Requires="a14">
+      <mc:AlternateContent xmlns:mc="http://schemas.openxmlformats.org/markup-compatibility/2006" xmlns:a14="http://schemas.microsoft.com/office/drawing/2010/main">
+        <mc:Choice Requires="a14">
           <p:sp>
             <p:nvSpPr>
               <p:cNvPr id="5" name="TextBox 4">
@@ -34031,7 +34118,7 @@
             </p:txBody>
           </p:sp>
         </mc:Choice>
-        <mc:Fallback>
+        <mc:Fallback xmlns="">
           <p:sp>
             <p:nvSpPr>
               <p:cNvPr id="5" name="TextBox 4">
@@ -34076,8 +34163,8 @@
           </p:sp>
         </mc:Fallback>
       </mc:AlternateContent>
-      <mc:AlternateContent xmlns:mc="http://schemas.openxmlformats.org/markup-compatibility/2006">
-        <mc:Choice xmlns:a14="http://schemas.microsoft.com/office/drawing/2010/main" Requires="a14">
+      <mc:AlternateContent xmlns:mc="http://schemas.openxmlformats.org/markup-compatibility/2006" xmlns:a14="http://schemas.microsoft.com/office/drawing/2010/main">
+        <mc:Choice Requires="a14">
           <p:sp>
             <p:nvSpPr>
               <p:cNvPr id="6" name="TextBox 5">
@@ -34159,7 +34246,7 @@
             </p:txBody>
           </p:sp>
         </mc:Choice>
-        <mc:Fallback>
+        <mc:Fallback xmlns="">
           <p:sp>
             <p:nvSpPr>
               <p:cNvPr id="6" name="TextBox 5">
@@ -34204,8 +34291,8 @@
           </p:sp>
         </mc:Fallback>
       </mc:AlternateContent>
-      <mc:AlternateContent xmlns:mc="http://schemas.openxmlformats.org/markup-compatibility/2006">
-        <mc:Choice xmlns:a14="http://schemas.microsoft.com/office/drawing/2010/main" Requires="a14">
+      <mc:AlternateContent xmlns:mc="http://schemas.openxmlformats.org/markup-compatibility/2006" xmlns:a14="http://schemas.microsoft.com/office/drawing/2010/main">
+        <mc:Choice Requires="a14">
           <p:sp>
             <p:nvSpPr>
               <p:cNvPr id="7" name="TextBox 6">
@@ -34330,7 +34417,7 @@
             </p:txBody>
           </p:sp>
         </mc:Choice>
-        <mc:Fallback>
+        <mc:Fallback xmlns="">
           <p:sp>
             <p:nvSpPr>
               <p:cNvPr id="7" name="TextBox 6">
@@ -34375,8 +34462,8 @@
           </p:sp>
         </mc:Fallback>
       </mc:AlternateContent>
-      <mc:AlternateContent xmlns:mc="http://schemas.openxmlformats.org/markup-compatibility/2006">
-        <mc:Choice xmlns:a14="http://schemas.microsoft.com/office/drawing/2010/main" Requires="a14">
+      <mc:AlternateContent xmlns:mc="http://schemas.openxmlformats.org/markup-compatibility/2006" xmlns:a14="http://schemas.microsoft.com/office/drawing/2010/main">
+        <mc:Choice Requires="a14">
           <p:sp>
             <p:nvSpPr>
               <p:cNvPr id="8" name="TextBox 7">
@@ -34433,7 +34520,7 @@
             </p:txBody>
           </p:sp>
         </mc:Choice>
-        <mc:Fallback>
+        <mc:Fallback xmlns="">
           <p:sp>
             <p:nvSpPr>
               <p:cNvPr id="8" name="TextBox 7">
@@ -34478,8 +34565,8 @@
           </p:sp>
         </mc:Fallback>
       </mc:AlternateContent>
-      <mc:AlternateContent xmlns:mc="http://schemas.openxmlformats.org/markup-compatibility/2006">
-        <mc:Choice xmlns:a14="http://schemas.microsoft.com/office/drawing/2010/main" Requires="a14">
+      <mc:AlternateContent xmlns:mc="http://schemas.openxmlformats.org/markup-compatibility/2006" xmlns:a14="http://schemas.microsoft.com/office/drawing/2010/main">
+        <mc:Choice Requires="a14">
           <p:sp>
             <p:nvSpPr>
               <p:cNvPr id="9" name="TextBox 8">
@@ -34536,7 +34623,7 @@
             </p:txBody>
           </p:sp>
         </mc:Choice>
-        <mc:Fallback>
+        <mc:Fallback xmlns="">
           <p:sp>
             <p:nvSpPr>
               <p:cNvPr id="9" name="TextBox 8">
@@ -35795,8 +35882,8 @@
           </a:p>
         </p:txBody>
       </p:sp>
-      <mc:AlternateContent xmlns:mc="http://schemas.openxmlformats.org/markup-compatibility/2006">
-        <mc:Choice xmlns:a14="http://schemas.microsoft.com/office/drawing/2010/main" Requires="a14">
+      <mc:AlternateContent xmlns:mc="http://schemas.openxmlformats.org/markup-compatibility/2006" xmlns:a14="http://schemas.microsoft.com/office/drawing/2010/main">
+        <mc:Choice Requires="a14">
           <p:sp>
             <p:nvSpPr>
               <p:cNvPr id="3" name="TextBox 2">
@@ -35878,7 +35965,7 @@
             </p:txBody>
           </p:sp>
         </mc:Choice>
-        <mc:Fallback>
+        <mc:Fallback xmlns="">
           <p:sp>
             <p:nvSpPr>
               <p:cNvPr id="3" name="TextBox 2">
@@ -35923,8 +36010,8 @@
           </p:sp>
         </mc:Fallback>
       </mc:AlternateContent>
-      <mc:AlternateContent xmlns:mc="http://schemas.openxmlformats.org/markup-compatibility/2006">
-        <mc:Choice xmlns:a14="http://schemas.microsoft.com/office/drawing/2010/main" Requires="a14">
+      <mc:AlternateContent xmlns:mc="http://schemas.openxmlformats.org/markup-compatibility/2006" xmlns:a14="http://schemas.microsoft.com/office/drawing/2010/main">
+        <mc:Choice Requires="a14">
           <p:sp>
             <p:nvSpPr>
               <p:cNvPr id="5" name="TextBox 4">
@@ -36006,7 +36093,7 @@
             </p:txBody>
           </p:sp>
         </mc:Choice>
-        <mc:Fallback>
+        <mc:Fallback xmlns="">
           <p:sp>
             <p:nvSpPr>
               <p:cNvPr id="5" name="TextBox 4">
@@ -36051,8 +36138,8 @@
           </p:sp>
         </mc:Fallback>
       </mc:AlternateContent>
-      <mc:AlternateContent xmlns:mc="http://schemas.openxmlformats.org/markup-compatibility/2006">
-        <mc:Choice xmlns:a14="http://schemas.microsoft.com/office/drawing/2010/main" Requires="a14">
+      <mc:AlternateContent xmlns:mc="http://schemas.openxmlformats.org/markup-compatibility/2006" xmlns:a14="http://schemas.microsoft.com/office/drawing/2010/main">
+        <mc:Choice Requires="a14">
           <p:sp>
             <p:nvSpPr>
               <p:cNvPr id="6" name="TextBox 5">
@@ -36134,7 +36221,7 @@
             </p:txBody>
           </p:sp>
         </mc:Choice>
-        <mc:Fallback>
+        <mc:Fallback xmlns="">
           <p:sp>
             <p:nvSpPr>
               <p:cNvPr id="6" name="TextBox 5">
@@ -36179,8 +36266,8 @@
           </p:sp>
         </mc:Fallback>
       </mc:AlternateContent>
-      <mc:AlternateContent xmlns:mc="http://schemas.openxmlformats.org/markup-compatibility/2006">
-        <mc:Choice xmlns:a14="http://schemas.microsoft.com/office/drawing/2010/main" Requires="a14">
+      <mc:AlternateContent xmlns:mc="http://schemas.openxmlformats.org/markup-compatibility/2006" xmlns:a14="http://schemas.microsoft.com/office/drawing/2010/main">
+        <mc:Choice Requires="a14">
           <p:sp>
             <p:nvSpPr>
               <p:cNvPr id="7" name="TextBox 6">
@@ -36305,7 +36392,7 @@
             </p:txBody>
           </p:sp>
         </mc:Choice>
-        <mc:Fallback>
+        <mc:Fallback xmlns="">
           <p:sp>
             <p:nvSpPr>
               <p:cNvPr id="7" name="TextBox 6">
@@ -36350,8 +36437,8 @@
           </p:sp>
         </mc:Fallback>
       </mc:AlternateContent>
-      <mc:AlternateContent xmlns:mc="http://schemas.openxmlformats.org/markup-compatibility/2006">
-        <mc:Choice xmlns:a14="http://schemas.microsoft.com/office/drawing/2010/main" Requires="a14">
+      <mc:AlternateContent xmlns:mc="http://schemas.openxmlformats.org/markup-compatibility/2006" xmlns:a14="http://schemas.microsoft.com/office/drawing/2010/main">
+        <mc:Choice Requires="a14">
           <p:sp>
             <p:nvSpPr>
               <p:cNvPr id="8" name="TextBox 7">
@@ -36408,7 +36495,7 @@
             </p:txBody>
           </p:sp>
         </mc:Choice>
-        <mc:Fallback>
+        <mc:Fallback xmlns="">
           <p:sp>
             <p:nvSpPr>
               <p:cNvPr id="8" name="TextBox 7">
@@ -36453,8 +36540,8 @@
           </p:sp>
         </mc:Fallback>
       </mc:AlternateContent>
-      <mc:AlternateContent xmlns:mc="http://schemas.openxmlformats.org/markup-compatibility/2006">
-        <mc:Choice xmlns:a14="http://schemas.microsoft.com/office/drawing/2010/main" Requires="a14">
+      <mc:AlternateContent xmlns:mc="http://schemas.openxmlformats.org/markup-compatibility/2006" xmlns:a14="http://schemas.microsoft.com/office/drawing/2010/main">
+        <mc:Choice Requires="a14">
           <p:sp>
             <p:nvSpPr>
               <p:cNvPr id="9" name="TextBox 8">
@@ -36511,7 +36598,7 @@
             </p:txBody>
           </p:sp>
         </mc:Choice>
-        <mc:Fallback>
+        <mc:Fallback xmlns="">
           <p:sp>
             <p:nvSpPr>
               <p:cNvPr id="9" name="TextBox 8">
@@ -38686,18 +38773,18 @@
 </file>
 
 <file path=customXml/item1.xml><?xml version="1.0" encoding="utf-8"?>
+<p:properties xmlns:p="http://schemas.microsoft.com/office/2006/metadata/properties" xmlns:xsi="http://www.w3.org/2001/XMLSchema-instance" xmlns:pc="http://schemas.microsoft.com/office/infopath/2007/PartnerControls">
+  <documentManagement/>
+</p:properties>
+</file>
+
+<file path=customXml/item2.xml><?xml version="1.0" encoding="utf-8"?>
 <?mso-contentType ?>
 <FormTemplates xmlns="http://schemas.microsoft.com/sharepoint/v3/contenttype/forms">
   <Display>DocumentLibraryForm</Display>
   <Edit>DocumentLibraryForm</Edit>
   <New>DocumentLibraryForm</New>
 </FormTemplates>
-</file>
-
-<file path=customXml/item2.xml><?xml version="1.0" encoding="utf-8"?>
-<p:properties xmlns:p="http://schemas.microsoft.com/office/2006/metadata/properties" xmlns:xsi="http://www.w3.org/2001/XMLSchema-instance" xmlns:pc="http://schemas.microsoft.com/office/infopath/2007/PartnerControls">
-  <documentManagement/>
-</p:properties>
 </file>
 
 <file path=customXml/item3.xml><?xml version="1.0" encoding="utf-8"?>
@@ -38833,18 +38920,18 @@
 </file>
 
 <file path=customXml/itemProps1.xml><?xml version="1.0" encoding="utf-8"?>
-<ds:datastoreItem xmlns:ds="http://schemas.openxmlformats.org/officeDocument/2006/customXml" ds:itemID="{6C1A3F1B-CE3A-47AB-9F84-47E786467973}">
+<ds:datastoreItem xmlns:ds="http://schemas.openxmlformats.org/officeDocument/2006/customXml" ds:itemID="{7ACF14CA-9E7F-410C-99DF-E0FAFDE78C11}">
   <ds:schemaRefs>
-    <ds:schemaRef ds:uri="http://schemas.microsoft.com/sharepoint/v3/contenttype/forms"/>
+    <ds:schemaRef ds:uri="http://schemas.microsoft.com/office/2006/metadata/properties"/>
+    <ds:schemaRef ds:uri="http://schemas.microsoft.com/office/infopath/2007/PartnerControls"/>
   </ds:schemaRefs>
 </ds:datastoreItem>
 </file>
 
 <file path=customXml/itemProps2.xml><?xml version="1.0" encoding="utf-8"?>
-<ds:datastoreItem xmlns:ds="http://schemas.openxmlformats.org/officeDocument/2006/customXml" ds:itemID="{7ACF14CA-9E7F-410C-99DF-E0FAFDE78C11}">
+<ds:datastoreItem xmlns:ds="http://schemas.openxmlformats.org/officeDocument/2006/customXml" ds:itemID="{6C1A3F1B-CE3A-47AB-9F84-47E786467973}">
   <ds:schemaRefs>
-    <ds:schemaRef ds:uri="http://schemas.microsoft.com/office/2006/metadata/properties"/>
-    <ds:schemaRef ds:uri="http://schemas.microsoft.com/office/infopath/2007/PartnerControls"/>
+    <ds:schemaRef ds:uri="http://schemas.microsoft.com/sharepoint/v3/contenttype/forms"/>
   </ds:schemaRefs>
 </ds:datastoreItem>
 </file>

</xml_diff>